<commit_message>
Update Weather Patterns in Brazil.pptx
added a few images
</commit_message>
<xml_diff>
--- a/Weather Patterns in Brazil.pptx
+++ b/Weather Patterns in Brazil.pptx
@@ -11,6 +11,7 @@
     <p:sldId id="261" r:id="rId5"/>
     <p:sldId id="260" r:id="rId6"/>
     <p:sldId id="259" r:id="rId7"/>
+    <p:sldId id="262" r:id="rId8"/>
   </p:sldIdLst>
   <p:sldSz cx="12192000" cy="6858000"/>
   <p:notesSz cx="6858000" cy="9144000"/>
@@ -109,6 +110,11 @@
       </a:defRPr>
     </a:lvl9pPr>
   </p:defaultTextStyle>
+  <p:extLst>
+    <p:ext uri="{EFAFB233-063F-42B5-8137-9DF3F51BA10A}">
+      <p15:sldGuideLst xmlns:p15="http://schemas.microsoft.com/office/powerpoint/2012/main"/>
+    </p:ext>
+  </p:extLst>
 </p:presentation>
 </file>
 
@@ -6727,35 +6733,156 @@
           </a:p>
         </p:txBody>
       </p:sp>
-      <p:sp>
-        <p:nvSpPr>
-          <p:cNvPr id="3" name="Content Placeholder 2">
+      <p:pic>
+        <p:nvPicPr>
+          <p:cNvPr id="5" name="Content Placeholder 4">
             <a:extLst>
               <a:ext uri="{FF2B5EF4-FFF2-40B4-BE49-F238E27FC236}">
-                <a16:creationId xmlns:a16="http://schemas.microsoft.com/office/drawing/2014/main" id="{91380D9B-49BA-FA98-CD69-1E3E7DF8BE13}"/>
+                <a16:creationId xmlns:a16="http://schemas.microsoft.com/office/drawing/2014/main" id="{40765DA0-8DE8-4A6C-1323-181F9696DFFC}"/>
               </a:ext>
             </a:extLst>
           </p:cNvPr>
-          <p:cNvSpPr>
-            <a:spLocks noGrp="1"/>
-          </p:cNvSpPr>
+          <p:cNvPicPr>
+            <a:picLocks noGrp="1" noChangeAspect="1"/>
+          </p:cNvPicPr>
           <p:nvPr>
             <p:ph idx="1"/>
           </p:nvPr>
-        </p:nvSpPr>
-        <p:spPr/>
-        <p:txBody>
-          <a:bodyPr/>
-          <a:lstStyle/>
-          <a:p>
-            <a:endParaRPr lang="en-AU" b="1" dirty="0"/>
-          </a:p>
-        </p:txBody>
-      </p:sp>
+        </p:nvPicPr>
+        <p:blipFill>
+          <a:blip r:embed="rId2"/>
+          <a:stretch>
+            <a:fillRect/>
+          </a:stretch>
+        </p:blipFill>
+        <p:spPr>
+          <a:xfrm>
+            <a:off x="677334" y="2006600"/>
+            <a:ext cx="4645078" cy="3881437"/>
+          </a:xfrm>
+        </p:spPr>
+      </p:pic>
+      <p:pic>
+        <p:nvPicPr>
+          <p:cNvPr id="7" name="Picture 6">
+            <a:extLst>
+              <a:ext uri="{FF2B5EF4-FFF2-40B4-BE49-F238E27FC236}">
+                <a16:creationId xmlns:a16="http://schemas.microsoft.com/office/drawing/2014/main" id="{A936E8DB-4A31-9E8F-F922-DD24D9FB8DF0}"/>
+              </a:ext>
+            </a:extLst>
+          </p:cNvPr>
+          <p:cNvPicPr>
+            <a:picLocks noChangeAspect="1"/>
+          </p:cNvPicPr>
+          <p:nvPr/>
+        </p:nvPicPr>
+        <p:blipFill>
+          <a:blip r:embed="rId3"/>
+          <a:stretch>
+            <a:fillRect/>
+          </a:stretch>
+        </p:blipFill>
+        <p:spPr>
+          <a:xfrm>
+            <a:off x="5550568" y="2050716"/>
+            <a:ext cx="5366164" cy="1934029"/>
+          </a:xfrm>
+          <a:prstGeom prst="rect">
+            <a:avLst/>
+          </a:prstGeom>
+        </p:spPr>
+      </p:pic>
     </p:spTree>
     <p:extLst>
       <p:ext uri="{BB962C8B-B14F-4D97-AF65-F5344CB8AC3E}">
         <p14:creationId xmlns:p14="http://schemas.microsoft.com/office/powerpoint/2010/main" val="1081709717"/>
+      </p:ext>
+    </p:extLst>
+  </p:cSld>
+  <p:clrMapOvr>
+    <a:masterClrMapping/>
+  </p:clrMapOvr>
+</p:sld>
+</file>
+
+<file path=ppt/slides/slide7.xml><?xml version="1.0" encoding="utf-8"?>
+<p:sld xmlns:a="http://schemas.openxmlformats.org/drawingml/2006/main" xmlns:r="http://schemas.openxmlformats.org/officeDocument/2006/relationships" xmlns:p="http://schemas.openxmlformats.org/presentationml/2006/main">
+  <p:cSld>
+    <p:spTree>
+      <p:nvGrpSpPr>
+        <p:cNvPr id="1" name=""/>
+        <p:cNvGrpSpPr/>
+        <p:nvPr/>
+      </p:nvGrpSpPr>
+      <p:grpSpPr>
+        <a:xfrm>
+          <a:off x="0" y="0"/>
+          <a:ext cx="0" cy="0"/>
+          <a:chOff x="0" y="0"/>
+          <a:chExt cx="0" cy="0"/>
+        </a:xfrm>
+      </p:grpSpPr>
+      <p:sp>
+        <p:nvSpPr>
+          <p:cNvPr id="2" name="Title 1">
+            <a:extLst>
+              <a:ext uri="{FF2B5EF4-FFF2-40B4-BE49-F238E27FC236}">
+                <a16:creationId xmlns:a16="http://schemas.microsoft.com/office/drawing/2014/main" id="{A00B354C-3D06-90A5-DC2C-83500062A034}"/>
+              </a:ext>
+            </a:extLst>
+          </p:cNvPr>
+          <p:cNvSpPr>
+            <a:spLocks noGrp="1"/>
+          </p:cNvSpPr>
+          <p:nvPr>
+            <p:ph type="title"/>
+          </p:nvPr>
+        </p:nvSpPr>
+        <p:spPr/>
+        <p:txBody>
+          <a:bodyPr/>
+          <a:lstStyle/>
+          <a:p>
+            <a:r>
+              <a:rPr lang="en-AU" dirty="0"/>
+              <a:t>Our Webpages in Flask</a:t>
+            </a:r>
+          </a:p>
+        </p:txBody>
+      </p:sp>
+      <p:pic>
+        <p:nvPicPr>
+          <p:cNvPr id="5" name="Content Placeholder 4">
+            <a:extLst>
+              <a:ext uri="{FF2B5EF4-FFF2-40B4-BE49-F238E27FC236}">
+                <a16:creationId xmlns:a16="http://schemas.microsoft.com/office/drawing/2014/main" id="{DCF572C5-0245-4910-8564-27431BCE7B65}"/>
+              </a:ext>
+            </a:extLst>
+          </p:cNvPr>
+          <p:cNvPicPr>
+            <a:picLocks noGrp="1" noChangeAspect="1"/>
+          </p:cNvPicPr>
+          <p:nvPr>
+            <p:ph idx="1"/>
+          </p:nvPr>
+        </p:nvPicPr>
+        <p:blipFill>
+          <a:blip r:embed="rId2"/>
+          <a:stretch>
+            <a:fillRect/>
+          </a:stretch>
+        </p:blipFill>
+        <p:spPr>
+          <a:xfrm>
+            <a:off x="326236" y="1775579"/>
+            <a:ext cx="5646568" cy="3470190"/>
+          </a:xfrm>
+        </p:spPr>
+      </p:pic>
+    </p:spTree>
+    <p:extLst>
+      <p:ext uri="{BB962C8B-B14F-4D97-AF65-F5344CB8AC3E}">
+        <p14:creationId xmlns:p14="http://schemas.microsoft.com/office/powerpoint/2010/main" val="3726609739"/>
       </p:ext>
     </p:extLst>
   </p:cSld>

</xml_diff>

<commit_message>
set up file structure to run app.js
</commit_message>
<xml_diff>
--- a/Weather Patterns in Brazil.pptx
+++ b/Weather Patterns in Brazil.pptx
@@ -852,7 +852,7 @@
           <a:p>
             <a:fld id="{A8F36ACA-9C56-4454-8506-E8058D942A62}" type="datetimeFigureOut">
               <a:rPr lang="en-AU" smtClean="0"/>
-              <a:t>8/09/2022</a:t>
+              <a:t>11/09/2022</a:t>
             </a:fld>
             <a:endParaRPr lang="en-AU"/>
           </a:p>
@@ -1103,7 +1103,7 @@
           <a:p>
             <a:fld id="{A8F36ACA-9C56-4454-8506-E8058D942A62}" type="datetimeFigureOut">
               <a:rPr lang="en-AU" smtClean="0"/>
-              <a:t>8/09/2022</a:t>
+              <a:t>11/09/2022</a:t>
             </a:fld>
             <a:endParaRPr lang="en-AU"/>
           </a:p>
@@ -1417,7 +1417,7 @@
           <a:p>
             <a:fld id="{A8F36ACA-9C56-4454-8506-E8058D942A62}" type="datetimeFigureOut">
               <a:rPr lang="en-AU" smtClean="0"/>
-              <a:t>8/09/2022</a:t>
+              <a:t>11/09/2022</a:t>
             </a:fld>
             <a:endParaRPr lang="en-AU"/>
           </a:p>
@@ -1758,7 +1758,7 @@
           <a:p>
             <a:fld id="{A8F36ACA-9C56-4454-8506-E8058D942A62}" type="datetimeFigureOut">
               <a:rPr lang="en-AU" smtClean="0"/>
-              <a:t>8/09/2022</a:t>
+              <a:t>11/09/2022</a:t>
             </a:fld>
             <a:endParaRPr lang="en-AU"/>
           </a:p>
@@ -2072,7 +2072,7 @@
           <a:p>
             <a:fld id="{A8F36ACA-9C56-4454-8506-E8058D942A62}" type="datetimeFigureOut">
               <a:rPr lang="en-AU" smtClean="0"/>
-              <a:t>8/09/2022</a:t>
+              <a:t>11/09/2022</a:t>
             </a:fld>
             <a:endParaRPr lang="en-AU"/>
           </a:p>
@@ -2465,7 +2465,7 @@
           <a:p>
             <a:fld id="{A8F36ACA-9C56-4454-8506-E8058D942A62}" type="datetimeFigureOut">
               <a:rPr lang="en-AU" smtClean="0"/>
-              <a:t>8/09/2022</a:t>
+              <a:t>11/09/2022</a:t>
             </a:fld>
             <a:endParaRPr lang="en-AU"/>
           </a:p>
@@ -2635,7 +2635,7 @@
           <a:p>
             <a:fld id="{A8F36ACA-9C56-4454-8506-E8058D942A62}" type="datetimeFigureOut">
               <a:rPr lang="en-AU" smtClean="0"/>
-              <a:t>8/09/2022</a:t>
+              <a:t>11/09/2022</a:t>
             </a:fld>
             <a:endParaRPr lang="en-AU"/>
           </a:p>
@@ -2815,7 +2815,7 @@
           <a:p>
             <a:fld id="{A8F36ACA-9C56-4454-8506-E8058D942A62}" type="datetimeFigureOut">
               <a:rPr lang="en-AU" smtClean="0"/>
-              <a:t>8/09/2022</a:t>
+              <a:t>11/09/2022</a:t>
             </a:fld>
             <a:endParaRPr lang="en-AU"/>
           </a:p>
@@ -2991,7 +2991,7 @@
           <a:p>
             <a:fld id="{A8F36ACA-9C56-4454-8506-E8058D942A62}" type="datetimeFigureOut">
               <a:rPr lang="en-AU" smtClean="0"/>
-              <a:t>8/09/2022</a:t>
+              <a:t>11/09/2022</a:t>
             </a:fld>
             <a:endParaRPr lang="en-AU"/>
           </a:p>
@@ -3238,7 +3238,7 @@
           <a:p>
             <a:fld id="{A8F36ACA-9C56-4454-8506-E8058D942A62}" type="datetimeFigureOut">
               <a:rPr lang="en-AU" smtClean="0"/>
-              <a:t>8/09/2022</a:t>
+              <a:t>11/09/2022</a:t>
             </a:fld>
             <a:endParaRPr lang="en-AU"/>
           </a:p>
@@ -3470,7 +3470,7 @@
           <a:p>
             <a:fld id="{A8F36ACA-9C56-4454-8506-E8058D942A62}" type="datetimeFigureOut">
               <a:rPr lang="en-AU" smtClean="0"/>
-              <a:t>8/09/2022</a:t>
+              <a:t>11/09/2022</a:t>
             </a:fld>
             <a:endParaRPr lang="en-AU"/>
           </a:p>
@@ -3844,7 +3844,7 @@
           <a:p>
             <a:fld id="{A8F36ACA-9C56-4454-8506-E8058D942A62}" type="datetimeFigureOut">
               <a:rPr lang="en-AU" smtClean="0"/>
-              <a:t>8/09/2022</a:t>
+              <a:t>11/09/2022</a:t>
             </a:fld>
             <a:endParaRPr lang="en-AU"/>
           </a:p>
@@ -3967,7 +3967,7 @@
           <a:p>
             <a:fld id="{A8F36ACA-9C56-4454-8506-E8058D942A62}" type="datetimeFigureOut">
               <a:rPr lang="en-AU" smtClean="0"/>
-              <a:t>8/09/2022</a:t>
+              <a:t>11/09/2022</a:t>
             </a:fld>
             <a:endParaRPr lang="en-AU"/>
           </a:p>
@@ -4062,7 +4062,7 @@
           <a:p>
             <a:fld id="{A8F36ACA-9C56-4454-8506-E8058D942A62}" type="datetimeFigureOut">
               <a:rPr lang="en-AU" smtClean="0"/>
-              <a:t>8/09/2022</a:t>
+              <a:t>11/09/2022</a:t>
             </a:fld>
             <a:endParaRPr lang="en-AU"/>
           </a:p>
@@ -4317,7 +4317,7 @@
           <a:p>
             <a:fld id="{A8F36ACA-9C56-4454-8506-E8058D942A62}" type="datetimeFigureOut">
               <a:rPr lang="en-AU" smtClean="0"/>
-              <a:t>8/09/2022</a:t>
+              <a:t>11/09/2022</a:t>
             </a:fld>
             <a:endParaRPr lang="en-AU"/>
           </a:p>
@@ -4580,7 +4580,7 @@
           <a:p>
             <a:fld id="{A8F36ACA-9C56-4454-8506-E8058D942A62}" type="datetimeFigureOut">
               <a:rPr lang="en-AU" smtClean="0"/>
-              <a:t>8/09/2022</a:t>
+              <a:t>11/09/2022</a:t>
             </a:fld>
             <a:endParaRPr lang="en-AU"/>
           </a:p>
@@ -5323,7 +5323,7 @@
           <a:p>
             <a:fld id="{A8F36ACA-9C56-4454-8506-E8058D942A62}" type="datetimeFigureOut">
               <a:rPr lang="en-AU" smtClean="0"/>
-              <a:t>8/09/2022</a:t>
+              <a:t>11/09/2022</a:t>
             </a:fld>
             <a:endParaRPr lang="en-AU"/>
           </a:p>
@@ -6050,15 +6050,7 @@
           <a:p>
             <a:r>
               <a:rPr lang="en-US" dirty="0"/>
-              <a:t>Hourly Climate data from 122 </a:t>
-            </a:r>
-            <a:r>
-              <a:rPr lang="en-US" dirty="0" err="1"/>
-              <a:t>weathes</a:t>
-            </a:r>
-            <a:r>
-              <a:rPr lang="en-US" dirty="0"/>
-              <a:t> stations between 2000 and 2021</a:t>
+              <a:t>Hourly Climate data from 122 weather stations between 2000 and 2021</a:t>
             </a:r>
             <a:endParaRPr lang="en-AU" dirty="0"/>
           </a:p>

</xml_diff>

<commit_message>
updated slideshow and cleaned app.py
</commit_message>
<xml_diff>
--- a/Weather Patterns in Brazil.pptx
+++ b/Weather Patterns in Brazil.pptx
@@ -11,7 +11,9 @@
     <p:sldId id="261" r:id="rId5"/>
     <p:sldId id="260" r:id="rId6"/>
     <p:sldId id="259" r:id="rId7"/>
-    <p:sldId id="262" r:id="rId8"/>
+    <p:sldId id="265" r:id="rId8"/>
+    <p:sldId id="263" r:id="rId9"/>
+    <p:sldId id="264" r:id="rId10"/>
   </p:sldIdLst>
   <p:sldSz cx="12192000" cy="6858000"/>
   <p:notesSz cx="6858000" cy="9144000"/>
@@ -852,7 +854,7 @@
           <a:p>
             <a:fld id="{A8F36ACA-9C56-4454-8506-E8058D942A62}" type="datetimeFigureOut">
               <a:rPr lang="en-AU" smtClean="0"/>
-              <a:t>11/09/2022</a:t>
+              <a:t>8/9/2022</a:t>
             </a:fld>
             <a:endParaRPr lang="en-AU"/>
           </a:p>
@@ -1103,7 +1105,7 @@
           <a:p>
             <a:fld id="{A8F36ACA-9C56-4454-8506-E8058D942A62}" type="datetimeFigureOut">
               <a:rPr lang="en-AU" smtClean="0"/>
-              <a:t>11/09/2022</a:t>
+              <a:t>8/9/2022</a:t>
             </a:fld>
             <a:endParaRPr lang="en-AU"/>
           </a:p>
@@ -1417,7 +1419,7 @@
           <a:p>
             <a:fld id="{A8F36ACA-9C56-4454-8506-E8058D942A62}" type="datetimeFigureOut">
               <a:rPr lang="en-AU" smtClean="0"/>
-              <a:t>11/09/2022</a:t>
+              <a:t>8/9/2022</a:t>
             </a:fld>
             <a:endParaRPr lang="en-AU"/>
           </a:p>
@@ -1758,7 +1760,7 @@
           <a:p>
             <a:fld id="{A8F36ACA-9C56-4454-8506-E8058D942A62}" type="datetimeFigureOut">
               <a:rPr lang="en-AU" smtClean="0"/>
-              <a:t>11/09/2022</a:t>
+              <a:t>8/9/2022</a:t>
             </a:fld>
             <a:endParaRPr lang="en-AU"/>
           </a:p>
@@ -2072,7 +2074,7 @@
           <a:p>
             <a:fld id="{A8F36ACA-9C56-4454-8506-E8058D942A62}" type="datetimeFigureOut">
               <a:rPr lang="en-AU" smtClean="0"/>
-              <a:t>11/09/2022</a:t>
+              <a:t>8/9/2022</a:t>
             </a:fld>
             <a:endParaRPr lang="en-AU"/>
           </a:p>
@@ -2465,7 +2467,7 @@
           <a:p>
             <a:fld id="{A8F36ACA-9C56-4454-8506-E8058D942A62}" type="datetimeFigureOut">
               <a:rPr lang="en-AU" smtClean="0"/>
-              <a:t>11/09/2022</a:t>
+              <a:t>8/9/2022</a:t>
             </a:fld>
             <a:endParaRPr lang="en-AU"/>
           </a:p>
@@ -2635,7 +2637,7 @@
           <a:p>
             <a:fld id="{A8F36ACA-9C56-4454-8506-E8058D942A62}" type="datetimeFigureOut">
               <a:rPr lang="en-AU" smtClean="0"/>
-              <a:t>11/09/2022</a:t>
+              <a:t>8/9/2022</a:t>
             </a:fld>
             <a:endParaRPr lang="en-AU"/>
           </a:p>
@@ -2815,7 +2817,7 @@
           <a:p>
             <a:fld id="{A8F36ACA-9C56-4454-8506-E8058D942A62}" type="datetimeFigureOut">
               <a:rPr lang="en-AU" smtClean="0"/>
-              <a:t>11/09/2022</a:t>
+              <a:t>8/9/2022</a:t>
             </a:fld>
             <a:endParaRPr lang="en-AU"/>
           </a:p>
@@ -2991,7 +2993,7 @@
           <a:p>
             <a:fld id="{A8F36ACA-9C56-4454-8506-E8058D942A62}" type="datetimeFigureOut">
               <a:rPr lang="en-AU" smtClean="0"/>
-              <a:t>11/09/2022</a:t>
+              <a:t>8/9/2022</a:t>
             </a:fld>
             <a:endParaRPr lang="en-AU"/>
           </a:p>
@@ -3238,7 +3240,7 @@
           <a:p>
             <a:fld id="{A8F36ACA-9C56-4454-8506-E8058D942A62}" type="datetimeFigureOut">
               <a:rPr lang="en-AU" smtClean="0"/>
-              <a:t>11/09/2022</a:t>
+              <a:t>8/9/2022</a:t>
             </a:fld>
             <a:endParaRPr lang="en-AU"/>
           </a:p>
@@ -3470,7 +3472,7 @@
           <a:p>
             <a:fld id="{A8F36ACA-9C56-4454-8506-E8058D942A62}" type="datetimeFigureOut">
               <a:rPr lang="en-AU" smtClean="0"/>
-              <a:t>11/09/2022</a:t>
+              <a:t>8/9/2022</a:t>
             </a:fld>
             <a:endParaRPr lang="en-AU"/>
           </a:p>
@@ -3844,7 +3846,7 @@
           <a:p>
             <a:fld id="{A8F36ACA-9C56-4454-8506-E8058D942A62}" type="datetimeFigureOut">
               <a:rPr lang="en-AU" smtClean="0"/>
-              <a:t>11/09/2022</a:t>
+              <a:t>8/9/2022</a:t>
             </a:fld>
             <a:endParaRPr lang="en-AU"/>
           </a:p>
@@ -3967,7 +3969,7 @@
           <a:p>
             <a:fld id="{A8F36ACA-9C56-4454-8506-E8058D942A62}" type="datetimeFigureOut">
               <a:rPr lang="en-AU" smtClean="0"/>
-              <a:t>11/09/2022</a:t>
+              <a:t>8/9/2022</a:t>
             </a:fld>
             <a:endParaRPr lang="en-AU"/>
           </a:p>
@@ -4062,7 +4064,7 @@
           <a:p>
             <a:fld id="{A8F36ACA-9C56-4454-8506-E8058D942A62}" type="datetimeFigureOut">
               <a:rPr lang="en-AU" smtClean="0"/>
-              <a:t>11/09/2022</a:t>
+              <a:t>8/9/2022</a:t>
             </a:fld>
             <a:endParaRPr lang="en-AU"/>
           </a:p>
@@ -4317,7 +4319,7 @@
           <a:p>
             <a:fld id="{A8F36ACA-9C56-4454-8506-E8058D942A62}" type="datetimeFigureOut">
               <a:rPr lang="en-AU" smtClean="0"/>
-              <a:t>11/09/2022</a:t>
+              <a:t>8/9/2022</a:t>
             </a:fld>
             <a:endParaRPr lang="en-AU"/>
           </a:p>
@@ -4580,7 +4582,7 @@
           <a:p>
             <a:fld id="{A8F36ACA-9C56-4454-8506-E8058D942A62}" type="datetimeFigureOut">
               <a:rPr lang="en-AU" smtClean="0"/>
-              <a:t>11/09/2022</a:t>
+              <a:t>8/9/2022</a:t>
             </a:fld>
             <a:endParaRPr lang="en-AU"/>
           </a:p>
@@ -5323,7 +5325,7 @@
           <a:p>
             <a:fld id="{A8F36ACA-9C56-4454-8506-E8058D942A62}" type="datetimeFigureOut">
               <a:rPr lang="en-AU" smtClean="0"/>
-              <a:t>11/09/2022</a:t>
+              <a:t>8/9/2022</a:t>
             </a:fld>
             <a:endParaRPr lang="en-AU"/>
           </a:p>
@@ -6050,7 +6052,15 @@
           <a:p>
             <a:r>
               <a:rPr lang="en-US" dirty="0"/>
-              <a:t>Hourly Climate data from 122 weather stations between 2000 and 2021</a:t>
+              <a:t>Hourly Climate data from 122 </a:t>
+            </a:r>
+            <a:r>
+              <a:rPr lang="en-US" dirty="0" err="1"/>
+              <a:t>weathes</a:t>
+            </a:r>
+            <a:r>
+              <a:rPr lang="en-US" dirty="0"/>
+              <a:t> stations between 2000 and 2021</a:t>
             </a:r>
             <a:endParaRPr lang="en-AU" dirty="0"/>
           </a:p>
@@ -6370,12 +6380,20 @@
         </p:blipFill>
         <p:spPr>
           <a:xfrm>
-            <a:off x="10708898" y="1499793"/>
+            <a:off x="10446139" y="1499793"/>
             <a:ext cx="1611536" cy="3453786"/>
           </a:xfrm>
           <a:prstGeom prst="rect">
             <a:avLst/>
           </a:prstGeom>
+          <a:effectLst>
+            <a:glow rad="101600">
+              <a:schemeClr val="accent3">
+                <a:satMod val="175000"/>
+                <a:alpha val="40000"/>
+              </a:schemeClr>
+            </a:glow>
+          </a:effectLst>
         </p:spPr>
       </p:pic>
       <p:pic>
@@ -6406,12 +6424,20 @@
         </p:blipFill>
         <p:spPr>
           <a:xfrm>
-            <a:off x="6743816" y="1499793"/>
+            <a:off x="6544119" y="1499793"/>
             <a:ext cx="3696521" cy="3858414"/>
           </a:xfrm>
           <a:prstGeom prst="rect">
             <a:avLst/>
           </a:prstGeom>
+          <a:effectLst>
+            <a:glow rad="101600">
+              <a:schemeClr val="accent3">
+                <a:satMod val="175000"/>
+                <a:alpha val="40000"/>
+              </a:schemeClr>
+            </a:glow>
+          </a:effectLst>
         </p:spPr>
       </p:pic>
     </p:spTree>
@@ -6462,7 +6488,7 @@
         </p:nvSpPr>
         <p:spPr>
           <a:xfrm>
-            <a:off x="2129367" y="295533"/>
+            <a:off x="581469" y="368300"/>
             <a:ext cx="8596668" cy="1320800"/>
           </a:xfrm>
         </p:spPr>
@@ -6472,7 +6498,7 @@
           <a:p>
             <a:r>
               <a:rPr lang="en-AU" dirty="0"/>
-              <a:t>Example code</a:t>
+              <a:t>Cleaning the raw data</a:t>
             </a:r>
           </a:p>
         </p:txBody>
@@ -6540,6 +6566,14 @@
           <a:prstGeom prst="rect">
             <a:avLst/>
           </a:prstGeom>
+          <a:effectLst>
+            <a:glow rad="101600">
+              <a:schemeClr val="accent3">
+                <a:satMod val="175000"/>
+                <a:alpha val="40000"/>
+              </a:schemeClr>
+            </a:glow>
+          </a:effectLst>
         </p:spPr>
       </p:pic>
       <p:pic>
@@ -6570,6 +6604,14 @@
           <a:prstGeom prst="rect">
             <a:avLst/>
           </a:prstGeom>
+          <a:effectLst>
+            <a:glow rad="101600">
+              <a:schemeClr val="accent3">
+                <a:satMod val="175000"/>
+                <a:alpha val="40000"/>
+              </a:schemeClr>
+            </a:glow>
+          </a:effectLst>
         </p:spPr>
       </p:pic>
       <p:sp>
@@ -6608,31 +6650,6 @@
               <a:rPr lang="en-AU" dirty="0" err="1"/>
               <a:t>dataframe</a:t>
             </a:r>
-            <a:endParaRPr lang="en-AU" dirty="0"/>
-          </a:p>
-        </p:txBody>
-      </p:sp>
-      <p:sp>
-        <p:nvSpPr>
-          <p:cNvPr id="19" name="Content Placeholder 18">
-            <a:extLst>
-              <a:ext uri="{FF2B5EF4-FFF2-40B4-BE49-F238E27FC236}">
-                <a16:creationId xmlns:a16="http://schemas.microsoft.com/office/drawing/2014/main" id="{E7C16EE9-648D-8553-4021-A3D640ECF89A}"/>
-              </a:ext>
-            </a:extLst>
-          </p:cNvPr>
-          <p:cNvSpPr>
-            <a:spLocks noGrp="1"/>
-          </p:cNvSpPr>
-          <p:nvPr>
-            <p:ph idx="1"/>
-          </p:nvPr>
-        </p:nvSpPr>
-        <p:spPr/>
-        <p:txBody>
-          <a:bodyPr/>
-          <a:lstStyle/>
-          <a:p>
             <a:endParaRPr lang="en-AU" dirty="0"/>
           </a:p>
         </p:txBody>
@@ -6665,6 +6682,14 @@
           <a:prstGeom prst="rect">
             <a:avLst/>
           </a:prstGeom>
+          <a:effectLst>
+            <a:glow rad="101600">
+              <a:schemeClr val="accent3">
+                <a:satMod val="175000"/>
+                <a:alpha val="40000"/>
+              </a:schemeClr>
+            </a:glow>
+          </a:effectLst>
         </p:spPr>
       </p:pic>
     </p:spTree>
@@ -6713,24 +6738,29 @@
             <p:ph type="title"/>
           </p:nvPr>
         </p:nvSpPr>
-        <p:spPr/>
+        <p:spPr>
+          <a:xfrm>
+            <a:off x="522589" y="274989"/>
+            <a:ext cx="8596668" cy="1320800"/>
+          </a:xfrm>
+        </p:spPr>
         <p:txBody>
           <a:bodyPr/>
           <a:lstStyle/>
           <a:p>
             <a:r>
               <a:rPr lang="en-AU" dirty="0"/>
-              <a:t>Coding Approach 				</a:t>
+              <a:t>Creating Database	</a:t>
             </a:r>
           </a:p>
         </p:txBody>
       </p:sp>
       <p:pic>
         <p:nvPicPr>
-          <p:cNvPr id="5" name="Content Placeholder 4">
+          <p:cNvPr id="5" name="Content Placeholder 4" descr="Graphical user interface, application&#10;&#10;Description automatically generated">
             <a:extLst>
               <a:ext uri="{FF2B5EF4-FFF2-40B4-BE49-F238E27FC236}">
-                <a16:creationId xmlns:a16="http://schemas.microsoft.com/office/drawing/2014/main" id="{40765DA0-8DE8-4A6C-1323-181F9696DFFC}"/>
+                <a16:creationId xmlns:a16="http://schemas.microsoft.com/office/drawing/2014/main" id="{78881358-A388-E58D-DAB2-E961977BC4D0}"/>
               </a:ext>
             </a:extLst>
           </p:cNvPr>
@@ -6742,24 +6772,38 @@
           </p:nvPr>
         </p:nvPicPr>
         <p:blipFill>
-          <a:blip r:embed="rId2"/>
+          <a:blip r:embed="rId2">
+            <a:extLst>
+              <a:ext uri="{28A0092B-C50C-407E-A947-70E740481C1C}">
+                <a14:useLocalDpi xmlns:a14="http://schemas.microsoft.com/office/drawing/2010/main" val="0"/>
+              </a:ext>
+            </a:extLst>
+          </a:blip>
           <a:stretch>
             <a:fillRect/>
           </a:stretch>
         </p:blipFill>
         <p:spPr>
           <a:xfrm>
-            <a:off x="677334" y="2006600"/>
-            <a:ext cx="4645078" cy="3881437"/>
+            <a:off x="7248983" y="1169443"/>
+            <a:ext cx="4758450" cy="3467346"/>
           </a:xfrm>
+          <a:effectLst>
+            <a:glow rad="101600">
+              <a:schemeClr val="accent3">
+                <a:satMod val="175000"/>
+                <a:alpha val="40000"/>
+              </a:schemeClr>
+            </a:glow>
+          </a:effectLst>
         </p:spPr>
       </p:pic>
       <p:pic>
         <p:nvPicPr>
-          <p:cNvPr id="7" name="Picture 6">
+          <p:cNvPr id="12" name="Picture 11" descr="Text&#10;&#10;Description automatically generated with low confidence">
             <a:extLst>
               <a:ext uri="{FF2B5EF4-FFF2-40B4-BE49-F238E27FC236}">
-                <a16:creationId xmlns:a16="http://schemas.microsoft.com/office/drawing/2014/main" id="{A936E8DB-4A31-9E8F-F922-DD24D9FB8DF0}"/>
+                <a16:creationId xmlns:a16="http://schemas.microsoft.com/office/drawing/2014/main" id="{08EBC901-095E-F600-3816-EB160552F7A8}"/>
               </a:ext>
             </a:extLst>
           </p:cNvPr>
@@ -6769,21 +6813,198 @@
           <p:nvPr/>
         </p:nvPicPr>
         <p:blipFill>
-          <a:blip r:embed="rId3"/>
+          <a:blip r:embed="rId3">
+            <a:extLst>
+              <a:ext uri="{28A0092B-C50C-407E-A947-70E740481C1C}">
+                <a14:useLocalDpi xmlns:a14="http://schemas.microsoft.com/office/drawing/2010/main" val="0"/>
+              </a:ext>
+            </a:extLst>
+          </a:blip>
           <a:stretch>
             <a:fillRect/>
           </a:stretch>
         </p:blipFill>
         <p:spPr>
           <a:xfrm>
-            <a:off x="5550568" y="2050716"/>
-            <a:ext cx="5366164" cy="1934029"/>
+            <a:off x="154727" y="1465302"/>
+            <a:ext cx="6897280" cy="2166034"/>
           </a:xfrm>
           <a:prstGeom prst="rect">
             <a:avLst/>
           </a:prstGeom>
+          <a:effectLst>
+            <a:glow rad="101600">
+              <a:schemeClr val="accent3">
+                <a:satMod val="175000"/>
+                <a:alpha val="40000"/>
+              </a:schemeClr>
+            </a:glow>
+          </a:effectLst>
         </p:spPr>
       </p:pic>
+      <p:pic>
+        <p:nvPicPr>
+          <p:cNvPr id="14" name="Picture 13" descr="Table&#10;&#10;Description automatically generated">
+            <a:extLst>
+              <a:ext uri="{FF2B5EF4-FFF2-40B4-BE49-F238E27FC236}">
+                <a16:creationId xmlns:a16="http://schemas.microsoft.com/office/drawing/2014/main" id="{EC68C5C2-2166-60B5-D459-C46A58BE6AEA}"/>
+              </a:ext>
+            </a:extLst>
+          </p:cNvPr>
+          <p:cNvPicPr>
+            <a:picLocks noChangeAspect="1"/>
+          </p:cNvPicPr>
+          <p:nvPr/>
+        </p:nvPicPr>
+        <p:blipFill>
+          <a:blip r:embed="rId4">
+            <a:extLst>
+              <a:ext uri="{28A0092B-C50C-407E-A947-70E740481C1C}">
+                <a14:useLocalDpi xmlns:a14="http://schemas.microsoft.com/office/drawing/2010/main" val="0"/>
+              </a:ext>
+            </a:extLst>
+          </a:blip>
+          <a:stretch>
+            <a:fillRect/>
+          </a:stretch>
+        </p:blipFill>
+        <p:spPr>
+          <a:xfrm>
+            <a:off x="325613" y="4167433"/>
+            <a:ext cx="6555508" cy="2415578"/>
+          </a:xfrm>
+          <a:prstGeom prst="rect">
+            <a:avLst/>
+          </a:prstGeom>
+          <a:effectLst>
+            <a:glow rad="101600">
+              <a:schemeClr val="accent3">
+                <a:satMod val="175000"/>
+                <a:alpha val="40000"/>
+              </a:schemeClr>
+            </a:glow>
+          </a:effectLst>
+        </p:spPr>
+      </p:pic>
+      <p:sp>
+        <p:nvSpPr>
+          <p:cNvPr id="15" name="TextBox 14">
+            <a:extLst>
+              <a:ext uri="{FF2B5EF4-FFF2-40B4-BE49-F238E27FC236}">
+                <a16:creationId xmlns:a16="http://schemas.microsoft.com/office/drawing/2014/main" id="{047BB14A-C75F-2FDE-0F0E-DEF70EA57B47}"/>
+              </a:ext>
+            </a:extLst>
+          </p:cNvPr>
+          <p:cNvSpPr txBox="1"/>
+          <p:nvPr/>
+        </p:nvSpPr>
+        <p:spPr>
+          <a:xfrm>
+            <a:off x="184567" y="1000345"/>
+            <a:ext cx="2946640" cy="369332"/>
+          </a:xfrm>
+          <a:prstGeom prst="rect">
+            <a:avLst/>
+          </a:prstGeom>
+          <a:noFill/>
+        </p:spPr>
+        <p:txBody>
+          <a:bodyPr wrap="none" rtlCol="0">
+            <a:spAutoFit/>
+          </a:bodyPr>
+          <a:lstStyle/>
+          <a:p>
+            <a:r>
+              <a:rPr lang="en-US" dirty="0"/>
+              <a:t>Pushing tables to </a:t>
+            </a:r>
+            <a:r>
+              <a:rPr lang="en-US" dirty="0" err="1"/>
+              <a:t>postgres</a:t>
+            </a:r>
+            <a:r>
+              <a:rPr lang="en-US" dirty="0"/>
+              <a:t> </a:t>
+            </a:r>
+          </a:p>
+        </p:txBody>
+      </p:sp>
+      <p:sp>
+        <p:nvSpPr>
+          <p:cNvPr id="16" name="TextBox 15">
+            <a:extLst>
+              <a:ext uri="{FF2B5EF4-FFF2-40B4-BE49-F238E27FC236}">
+                <a16:creationId xmlns:a16="http://schemas.microsoft.com/office/drawing/2014/main" id="{46384B30-BEED-D637-52F2-99565D1381BF}"/>
+              </a:ext>
+            </a:extLst>
+          </p:cNvPr>
+          <p:cNvSpPr txBox="1"/>
+          <p:nvPr/>
+        </p:nvSpPr>
+        <p:spPr>
+          <a:xfrm>
+            <a:off x="7526215" y="631013"/>
+            <a:ext cx="583814" cy="369332"/>
+          </a:xfrm>
+          <a:prstGeom prst="rect">
+            <a:avLst/>
+          </a:prstGeom>
+          <a:noFill/>
+        </p:spPr>
+        <p:txBody>
+          <a:bodyPr wrap="none" rtlCol="0">
+            <a:spAutoFit/>
+          </a:bodyPr>
+          <a:lstStyle/>
+          <a:p>
+            <a:r>
+              <a:rPr lang="en-US" dirty="0"/>
+              <a:t>ERD</a:t>
+            </a:r>
+          </a:p>
+        </p:txBody>
+      </p:sp>
+      <p:sp>
+        <p:nvSpPr>
+          <p:cNvPr id="17" name="TextBox 16">
+            <a:extLst>
+              <a:ext uri="{FF2B5EF4-FFF2-40B4-BE49-F238E27FC236}">
+                <a16:creationId xmlns:a16="http://schemas.microsoft.com/office/drawing/2014/main" id="{D0453DE4-BFCE-99CB-849D-8AAEBEB6B7FD}"/>
+              </a:ext>
+            </a:extLst>
+          </p:cNvPr>
+          <p:cNvSpPr txBox="1"/>
+          <p:nvPr/>
+        </p:nvSpPr>
+        <p:spPr>
+          <a:xfrm>
+            <a:off x="7248983" y="5115744"/>
+            <a:ext cx="2848115" cy="830997"/>
+          </a:xfrm>
+          <a:prstGeom prst="rect">
+            <a:avLst/>
+          </a:prstGeom>
+          <a:noFill/>
+        </p:spPr>
+        <p:txBody>
+          <a:bodyPr wrap="square" rtlCol="0">
+            <a:spAutoFit/>
+          </a:bodyPr>
+          <a:lstStyle/>
+          <a:p>
+            <a:r>
+              <a:rPr lang="en-US" sz="2400" dirty="0"/>
+              <a:t>North: 5595 rows</a:t>
+            </a:r>
+          </a:p>
+          <a:p>
+            <a:r>
+              <a:rPr lang="en-US" sz="2400" dirty="0"/>
+              <a:t>Stations: 24 rows</a:t>
+            </a:r>
+          </a:p>
+        </p:txBody>
+      </p:sp>
     </p:spTree>
     <p:extLst>
       <p:ext uri="{BB962C8B-B14F-4D97-AF65-F5344CB8AC3E}">
@@ -6819,7 +7040,7 @@
           <p:cNvPr id="2" name="Title 1">
             <a:extLst>
               <a:ext uri="{FF2B5EF4-FFF2-40B4-BE49-F238E27FC236}">
-                <a16:creationId xmlns:a16="http://schemas.microsoft.com/office/drawing/2014/main" id="{A00B354C-3D06-90A5-DC2C-83500062A034}"/>
+                <a16:creationId xmlns:a16="http://schemas.microsoft.com/office/drawing/2014/main" id="{C0DBA46E-303B-C56D-92CD-E0DE9CA9D31A}"/>
               </a:ext>
             </a:extLst>
           </p:cNvPr>
@@ -6830,24 +7051,29 @@
             <p:ph type="title"/>
           </p:nvPr>
         </p:nvSpPr>
-        <p:spPr/>
+        <p:spPr>
+          <a:xfrm>
+            <a:off x="109149" y="128744"/>
+            <a:ext cx="8596668" cy="1320800"/>
+          </a:xfrm>
+        </p:spPr>
         <p:txBody>
           <a:bodyPr/>
           <a:lstStyle/>
           <a:p>
             <a:r>
-              <a:rPr lang="en-AU" dirty="0"/>
-              <a:t>Our Webpages in Flask</a:t>
+              <a:rPr lang="en-US" dirty="0"/>
+              <a:t>Creating Flask routes</a:t>
             </a:r>
           </a:p>
         </p:txBody>
       </p:sp>
       <p:pic>
         <p:nvPicPr>
-          <p:cNvPr id="5" name="Content Placeholder 4">
+          <p:cNvPr id="5" name="Content Placeholder 4" descr="Text&#10;&#10;Description automatically generated">
             <a:extLst>
               <a:ext uri="{FF2B5EF4-FFF2-40B4-BE49-F238E27FC236}">
-                <a16:creationId xmlns:a16="http://schemas.microsoft.com/office/drawing/2014/main" id="{DCF572C5-0245-4910-8564-27431BCE7B65}"/>
+                <a16:creationId xmlns:a16="http://schemas.microsoft.com/office/drawing/2014/main" id="{D340B67F-7D8F-B4BB-912F-B4FB46EA9551}"/>
               </a:ext>
             </a:extLst>
           </p:cNvPr>
@@ -6859,22 +7085,389 @@
           </p:nvPr>
         </p:nvPicPr>
         <p:blipFill>
-          <a:blip r:embed="rId2"/>
+          <a:blip r:embed="rId2">
+            <a:extLst>
+              <a:ext uri="{28A0092B-C50C-407E-A947-70E740481C1C}">
+                <a14:useLocalDpi xmlns:a14="http://schemas.microsoft.com/office/drawing/2010/main" val="0"/>
+              </a:ext>
+            </a:extLst>
+          </a:blip>
           <a:stretch>
             <a:fillRect/>
           </a:stretch>
         </p:blipFill>
         <p:spPr>
           <a:xfrm>
-            <a:off x="326236" y="1775579"/>
-            <a:ext cx="5646568" cy="3470190"/>
+            <a:off x="6804074" y="187943"/>
+            <a:ext cx="5180303" cy="6482113"/>
           </a:xfrm>
+          <a:effectLst>
+            <a:glow rad="101600">
+              <a:schemeClr val="accent3">
+                <a:satMod val="175000"/>
+                <a:alpha val="40000"/>
+              </a:schemeClr>
+            </a:glow>
+          </a:effectLst>
+        </p:spPr>
+      </p:pic>
+      <p:pic>
+        <p:nvPicPr>
+          <p:cNvPr id="7" name="Picture 6" descr="Text&#10;&#10;Description automatically generated with low confidence">
+            <a:extLst>
+              <a:ext uri="{FF2B5EF4-FFF2-40B4-BE49-F238E27FC236}">
+                <a16:creationId xmlns:a16="http://schemas.microsoft.com/office/drawing/2014/main" id="{890568C8-1926-6647-7BE7-8E6280FB3981}"/>
+              </a:ext>
+            </a:extLst>
+          </p:cNvPr>
+          <p:cNvPicPr>
+            <a:picLocks noChangeAspect="1"/>
+          </p:cNvPicPr>
+          <p:nvPr/>
+        </p:nvPicPr>
+        <p:blipFill>
+          <a:blip r:embed="rId3">
+            <a:extLst>
+              <a:ext uri="{28A0092B-C50C-407E-A947-70E740481C1C}">
+                <a14:useLocalDpi xmlns:a14="http://schemas.microsoft.com/office/drawing/2010/main" val="0"/>
+              </a:ext>
+            </a:extLst>
+          </a:blip>
+          <a:stretch>
+            <a:fillRect/>
+          </a:stretch>
+        </p:blipFill>
+        <p:spPr>
+          <a:xfrm>
+            <a:off x="386971" y="789144"/>
+            <a:ext cx="5515251" cy="5008101"/>
+          </a:xfrm>
+          <a:prstGeom prst="rect">
+            <a:avLst/>
+          </a:prstGeom>
+          <a:effectLst>
+            <a:glow rad="101600">
+              <a:schemeClr val="accent3">
+                <a:satMod val="175000"/>
+                <a:alpha val="40000"/>
+              </a:schemeClr>
+            </a:glow>
+          </a:effectLst>
+        </p:spPr>
+      </p:pic>
+      <p:sp>
+        <p:nvSpPr>
+          <p:cNvPr id="8" name="TextBox 7">
+            <a:extLst>
+              <a:ext uri="{FF2B5EF4-FFF2-40B4-BE49-F238E27FC236}">
+                <a16:creationId xmlns:a16="http://schemas.microsoft.com/office/drawing/2014/main" id="{23C903E6-40BE-0AAC-4B0B-18A4D4BAA925}"/>
+              </a:ext>
+            </a:extLst>
+          </p:cNvPr>
+          <p:cNvSpPr txBox="1"/>
+          <p:nvPr/>
+        </p:nvSpPr>
+        <p:spPr>
+          <a:xfrm>
+            <a:off x="386971" y="5934670"/>
+            <a:ext cx="6281115" cy="646331"/>
+          </a:xfrm>
+          <a:prstGeom prst="rect">
+            <a:avLst/>
+          </a:prstGeom>
+          <a:noFill/>
+        </p:spPr>
+        <p:txBody>
+          <a:bodyPr wrap="square" rtlCol="0">
+            <a:spAutoFit/>
+          </a:bodyPr>
+          <a:lstStyle/>
+          <a:p>
+            <a:r>
+              <a:rPr lang="en-US" dirty="0"/>
+              <a:t>One route connects the correct Station table row to the corresponding North table row </a:t>
+            </a:r>
+          </a:p>
+        </p:txBody>
+      </p:sp>
+    </p:spTree>
+    <p:extLst>
+      <p:ext uri="{BB962C8B-B14F-4D97-AF65-F5344CB8AC3E}">
+        <p14:creationId xmlns:p14="http://schemas.microsoft.com/office/powerpoint/2010/main" val="3501464866"/>
+      </p:ext>
+    </p:extLst>
+  </p:cSld>
+  <p:clrMapOvr>
+    <a:masterClrMapping/>
+  </p:clrMapOvr>
+</p:sld>
+</file>
+
+<file path=ppt/slides/slide8.xml><?xml version="1.0" encoding="utf-8"?>
+<p:sld xmlns:a="http://schemas.openxmlformats.org/drawingml/2006/main" xmlns:r="http://schemas.openxmlformats.org/officeDocument/2006/relationships" xmlns:p="http://schemas.openxmlformats.org/presentationml/2006/main">
+  <p:cSld>
+    <p:spTree>
+      <p:nvGrpSpPr>
+        <p:cNvPr id="1" name=""/>
+        <p:cNvGrpSpPr/>
+        <p:nvPr/>
+      </p:nvGrpSpPr>
+      <p:grpSpPr>
+        <a:xfrm>
+          <a:off x="0" y="0"/>
+          <a:ext cx="0" cy="0"/>
+          <a:chOff x="0" y="0"/>
+          <a:chExt cx="0" cy="0"/>
+        </a:xfrm>
+      </p:grpSpPr>
+      <p:sp>
+        <p:nvSpPr>
+          <p:cNvPr id="2" name="Title 1">
+            <a:extLst>
+              <a:ext uri="{FF2B5EF4-FFF2-40B4-BE49-F238E27FC236}">
+                <a16:creationId xmlns:a16="http://schemas.microsoft.com/office/drawing/2014/main" id="{68AC815D-1FEC-E868-CCDC-91B1E65CEEA4}"/>
+              </a:ext>
+            </a:extLst>
+          </p:cNvPr>
+          <p:cNvSpPr>
+            <a:spLocks noGrp="1"/>
+          </p:cNvSpPr>
+          <p:nvPr>
+            <p:ph type="title"/>
+          </p:nvPr>
+        </p:nvSpPr>
+        <p:spPr>
+          <a:xfrm>
+            <a:off x="1268177" y="454856"/>
+            <a:ext cx="8596668" cy="1320800"/>
+          </a:xfrm>
+        </p:spPr>
+        <p:txBody>
+          <a:bodyPr/>
+          <a:lstStyle/>
+          <a:p>
+            <a:r>
+              <a:rPr lang="en-US" dirty="0"/>
+              <a:t>HTML</a:t>
+            </a:r>
+          </a:p>
+        </p:txBody>
+      </p:sp>
+      <p:pic>
+        <p:nvPicPr>
+          <p:cNvPr id="5" name="Content Placeholder 4" descr="Text&#10;&#10;Description automatically generated">
+            <a:extLst>
+              <a:ext uri="{FF2B5EF4-FFF2-40B4-BE49-F238E27FC236}">
+                <a16:creationId xmlns:a16="http://schemas.microsoft.com/office/drawing/2014/main" id="{9F554EC1-EBE8-EE52-7CAC-741482F5A349}"/>
+              </a:ext>
+            </a:extLst>
+          </p:cNvPr>
+          <p:cNvPicPr>
+            <a:picLocks noGrp="1" noChangeAspect="1"/>
+          </p:cNvPicPr>
+          <p:nvPr>
+            <p:ph idx="1"/>
+          </p:nvPr>
+        </p:nvPicPr>
+        <p:blipFill>
+          <a:blip r:embed="rId2">
+            <a:extLst>
+              <a:ext uri="{28A0092B-C50C-407E-A947-70E740481C1C}">
+                <a14:useLocalDpi xmlns:a14="http://schemas.microsoft.com/office/drawing/2010/main" val="0"/>
+              </a:ext>
+            </a:extLst>
+          </a:blip>
+          <a:stretch>
+            <a:fillRect/>
+          </a:stretch>
+        </p:blipFill>
+        <p:spPr>
+          <a:xfrm>
+            <a:off x="4546956" y="144499"/>
+            <a:ext cx="7419854" cy="2692400"/>
+          </a:xfrm>
+          <a:effectLst>
+            <a:glow rad="101600">
+              <a:schemeClr val="accent3">
+                <a:satMod val="175000"/>
+                <a:alpha val="40000"/>
+              </a:schemeClr>
+            </a:glow>
+          </a:effectLst>
+        </p:spPr>
+      </p:pic>
+      <p:pic>
+        <p:nvPicPr>
+          <p:cNvPr id="9" name="Picture 8" descr="Graphical user interface, text, application&#10;&#10;Description automatically generated">
+            <a:extLst>
+              <a:ext uri="{FF2B5EF4-FFF2-40B4-BE49-F238E27FC236}">
+                <a16:creationId xmlns:a16="http://schemas.microsoft.com/office/drawing/2014/main" id="{2C284F0A-0DAF-70F2-B1DA-74951CBC8C5E}"/>
+              </a:ext>
+            </a:extLst>
+          </p:cNvPr>
+          <p:cNvPicPr>
+            <a:picLocks noChangeAspect="1"/>
+          </p:cNvPicPr>
+          <p:nvPr/>
+        </p:nvPicPr>
+        <p:blipFill>
+          <a:blip r:embed="rId3">
+            <a:extLst>
+              <a:ext uri="{28A0092B-C50C-407E-A947-70E740481C1C}">
+                <a14:useLocalDpi xmlns:a14="http://schemas.microsoft.com/office/drawing/2010/main" val="0"/>
+              </a:ext>
+            </a:extLst>
+          </a:blip>
+          <a:stretch>
+            <a:fillRect/>
+          </a:stretch>
+        </p:blipFill>
+        <p:spPr>
+          <a:xfrm>
+            <a:off x="1065203" y="3147256"/>
+            <a:ext cx="6963506" cy="3380980"/>
+          </a:xfrm>
+          <a:prstGeom prst="rect">
+            <a:avLst/>
+          </a:prstGeom>
+          <a:effectLst>
+            <a:glow rad="101600">
+              <a:schemeClr val="accent3">
+                <a:satMod val="175000"/>
+                <a:alpha val="40000"/>
+              </a:schemeClr>
+            </a:glow>
+          </a:effectLst>
+        </p:spPr>
+      </p:pic>
+      <p:pic>
+        <p:nvPicPr>
+          <p:cNvPr id="11" name="Picture 10" descr="Graphical user interface, text, website&#10;&#10;Description automatically generated">
+            <a:extLst>
+              <a:ext uri="{FF2B5EF4-FFF2-40B4-BE49-F238E27FC236}">
+                <a16:creationId xmlns:a16="http://schemas.microsoft.com/office/drawing/2014/main" id="{7AE60980-805E-6DBA-42B8-C2B94000024A}"/>
+              </a:ext>
+            </a:extLst>
+          </p:cNvPr>
+          <p:cNvPicPr>
+            <a:picLocks noChangeAspect="1"/>
+          </p:cNvPicPr>
+          <p:nvPr/>
+        </p:nvPicPr>
+        <p:blipFill>
+          <a:blip r:embed="rId4">
+            <a:extLst>
+              <a:ext uri="{28A0092B-C50C-407E-A947-70E740481C1C}">
+                <a14:useLocalDpi xmlns:a14="http://schemas.microsoft.com/office/drawing/2010/main" val="0"/>
+              </a:ext>
+            </a:extLst>
+          </a:blip>
+          <a:stretch>
+            <a:fillRect/>
+          </a:stretch>
+        </p:blipFill>
+        <p:spPr>
+          <a:xfrm>
+            <a:off x="326905" y="1490699"/>
+            <a:ext cx="4000500" cy="1079500"/>
+          </a:xfrm>
+          <a:prstGeom prst="rect">
+            <a:avLst/>
+          </a:prstGeom>
+          <a:effectLst>
+            <a:glow rad="101600">
+              <a:schemeClr val="accent3">
+                <a:satMod val="175000"/>
+                <a:alpha val="40000"/>
+              </a:schemeClr>
+            </a:glow>
+          </a:effectLst>
         </p:spPr>
       </p:pic>
     </p:spTree>
     <p:extLst>
       <p:ext uri="{BB962C8B-B14F-4D97-AF65-F5344CB8AC3E}">
-        <p14:creationId xmlns:p14="http://schemas.microsoft.com/office/powerpoint/2010/main" val="3726609739"/>
+        <p14:creationId xmlns:p14="http://schemas.microsoft.com/office/powerpoint/2010/main" val="645324752"/>
+      </p:ext>
+    </p:extLst>
+  </p:cSld>
+  <p:clrMapOvr>
+    <a:masterClrMapping/>
+  </p:clrMapOvr>
+</p:sld>
+</file>
+
+<file path=ppt/slides/slide9.xml><?xml version="1.0" encoding="utf-8"?>
+<p:sld xmlns:a="http://schemas.openxmlformats.org/drawingml/2006/main" xmlns:r="http://schemas.openxmlformats.org/officeDocument/2006/relationships" xmlns:p="http://schemas.openxmlformats.org/presentationml/2006/main">
+  <p:cSld>
+    <p:spTree>
+      <p:nvGrpSpPr>
+        <p:cNvPr id="1" name=""/>
+        <p:cNvGrpSpPr/>
+        <p:nvPr/>
+      </p:nvGrpSpPr>
+      <p:grpSpPr>
+        <a:xfrm>
+          <a:off x="0" y="0"/>
+          <a:ext cx="0" cy="0"/>
+          <a:chOff x="0" y="0"/>
+          <a:chExt cx="0" cy="0"/>
+        </a:xfrm>
+      </p:grpSpPr>
+      <p:sp>
+        <p:nvSpPr>
+          <p:cNvPr id="2" name="Title 1">
+            <a:extLst>
+              <a:ext uri="{FF2B5EF4-FFF2-40B4-BE49-F238E27FC236}">
+                <a16:creationId xmlns:a16="http://schemas.microsoft.com/office/drawing/2014/main" id="{58254633-7B4E-6368-9EEA-F233A6C9F647}"/>
+              </a:ext>
+            </a:extLst>
+          </p:cNvPr>
+          <p:cNvSpPr>
+            <a:spLocks noGrp="1"/>
+          </p:cNvSpPr>
+          <p:nvPr>
+            <p:ph type="title"/>
+          </p:nvPr>
+        </p:nvSpPr>
+        <p:spPr/>
+        <p:txBody>
+          <a:bodyPr/>
+          <a:lstStyle/>
+          <a:p>
+            <a:endParaRPr lang="en-US"/>
+          </a:p>
+        </p:txBody>
+      </p:sp>
+      <p:sp>
+        <p:nvSpPr>
+          <p:cNvPr id="3" name="Content Placeholder 2">
+            <a:extLst>
+              <a:ext uri="{FF2B5EF4-FFF2-40B4-BE49-F238E27FC236}">
+                <a16:creationId xmlns:a16="http://schemas.microsoft.com/office/drawing/2014/main" id="{6656810F-87F6-AEB8-CC18-553EE731914D}"/>
+              </a:ext>
+            </a:extLst>
+          </p:cNvPr>
+          <p:cNvSpPr>
+            <a:spLocks noGrp="1"/>
+          </p:cNvSpPr>
+          <p:nvPr>
+            <p:ph idx="1"/>
+          </p:nvPr>
+        </p:nvSpPr>
+        <p:spPr/>
+        <p:txBody>
+          <a:bodyPr/>
+          <a:lstStyle/>
+          <a:p>
+            <a:endParaRPr lang="en-US"/>
+          </a:p>
+        </p:txBody>
+      </p:sp>
+    </p:spTree>
+    <p:extLst>
+      <p:ext uri="{BB962C8B-B14F-4D97-AF65-F5344CB8AC3E}">
+        <p14:creationId xmlns:p14="http://schemas.microsoft.com/office/powerpoint/2010/main" val="90871544"/>
       </p:ext>
     </p:extLst>
   </p:cSld>

</xml_diff>